<commit_message>
slides for 2019-fall semester
</commit_message>
<xml_diff>
--- a/Lectures/lec04-counters/lab04-counter.pptx
+++ b/Lectures/lec04-counters/lab04-counter.pptx
@@ -353,7 +353,7 @@
                 <a:pPr eaLnBrk="1" hangingPunct="1">
                   <a:defRPr/>
                 </a:pPr>
-                <a:endParaRPr lang="zh-TW" altLang="en-US" smtClean="0"/>
+                <a:endParaRPr lang="zh-TW" altLang="en-US"/>
               </a:p>
             </p:txBody>
           </p:sp>
@@ -513,7 +513,7 @@
                 <a:pPr eaLnBrk="1" hangingPunct="1">
                   <a:defRPr/>
                 </a:pPr>
-                <a:endParaRPr lang="zh-TW" altLang="en-US" smtClean="0"/>
+                <a:endParaRPr lang="zh-TW" altLang="en-US"/>
               </a:p>
             </p:txBody>
           </p:sp>
@@ -682,7 +682,7 @@
                 <a:pPr eaLnBrk="1" hangingPunct="1">
                   <a:defRPr/>
                 </a:pPr>
-                <a:endParaRPr lang="zh-TW" altLang="en-US" smtClean="0"/>
+                <a:endParaRPr lang="zh-TW" altLang="en-US"/>
               </a:p>
             </p:txBody>
           </p:sp>
@@ -842,7 +842,7 @@
                 <a:pPr eaLnBrk="1" hangingPunct="1">
                   <a:defRPr/>
                 </a:pPr>
-                <a:endParaRPr lang="zh-TW" altLang="en-US" smtClean="0"/>
+                <a:endParaRPr lang="zh-TW" altLang="en-US"/>
               </a:p>
             </p:txBody>
           </p:sp>
@@ -1003,7 +1003,7 @@
               <a:pPr eaLnBrk="1" hangingPunct="1">
                 <a:defRPr/>
               </a:pPr>
-              <a:endParaRPr lang="zh-TW" altLang="en-US" smtClean="0"/>
+              <a:endParaRPr lang="zh-TW" altLang="en-US"/>
             </a:p>
           </p:txBody>
         </p:sp>
@@ -1155,7 +1155,7 @@
               <a:pPr eaLnBrk="1" hangingPunct="1">
                 <a:defRPr/>
               </a:pPr>
-              <a:endParaRPr lang="zh-TW" altLang="en-US" smtClean="0"/>
+              <a:endParaRPr lang="zh-TW" altLang="en-US"/>
             </a:p>
           </p:txBody>
         </p:sp>
@@ -1315,7 +1315,7 @@
               <a:pPr eaLnBrk="1" hangingPunct="1">
                 <a:defRPr/>
               </a:pPr>
-              <a:endParaRPr lang="zh-TW" altLang="en-US" smtClean="0"/>
+              <a:endParaRPr lang="zh-TW" altLang="en-US"/>
             </a:p>
           </p:txBody>
         </p:sp>
@@ -1542,10 +1542,9 @@
           <a:lstStyle/>
           <a:p>
             <a:r>
-              <a:rPr lang="zh-TW" altLang="en-US" smtClean="0"/>
+              <a:rPr lang="zh-TW" altLang="en-US"/>
               <a:t>按一下以編輯母片標題樣式</a:t>
             </a:r>
-            <a:endParaRPr lang="zh-TW" altLang="en-US"/>
           </a:p>
         </p:txBody>
       </p:sp>
@@ -1566,38 +1565,37 @@
           <a:p>
             <a:pPr lvl="0"/>
             <a:r>
-              <a:rPr lang="zh-TW" altLang="en-US" smtClean="0"/>
+              <a:rPr lang="zh-TW" altLang="en-US"/>
               <a:t>按一下以編輯母片文字樣式</a:t>
             </a:r>
           </a:p>
           <a:p>
             <a:pPr lvl="1"/>
             <a:r>
-              <a:rPr lang="zh-TW" altLang="en-US" smtClean="0"/>
+              <a:rPr lang="zh-TW" altLang="en-US"/>
               <a:t>第二層</a:t>
             </a:r>
           </a:p>
           <a:p>
             <a:pPr lvl="2"/>
             <a:r>
-              <a:rPr lang="zh-TW" altLang="en-US" smtClean="0"/>
+              <a:rPr lang="zh-TW" altLang="en-US"/>
               <a:t>第三層</a:t>
             </a:r>
           </a:p>
           <a:p>
             <a:pPr lvl="3"/>
             <a:r>
-              <a:rPr lang="zh-TW" altLang="en-US" smtClean="0"/>
+              <a:rPr lang="zh-TW" altLang="en-US"/>
               <a:t>第四層</a:t>
             </a:r>
           </a:p>
           <a:p>
             <a:pPr lvl="4"/>
             <a:r>
-              <a:rPr lang="zh-TW" altLang="en-US" smtClean="0"/>
+              <a:rPr lang="zh-TW" altLang="en-US"/>
               <a:t>第五層</a:t>
             </a:r>
-            <a:endParaRPr lang="zh-TW" altLang="en-US"/>
           </a:p>
         </p:txBody>
       </p:sp>
@@ -1743,10 +1741,9 @@
           <a:lstStyle/>
           <a:p>
             <a:r>
-              <a:rPr lang="zh-TW" altLang="en-US" smtClean="0"/>
+              <a:rPr lang="zh-TW" altLang="en-US"/>
               <a:t>按一下以編輯母片標題樣式</a:t>
             </a:r>
-            <a:endParaRPr lang="zh-TW" altLang="en-US"/>
           </a:p>
         </p:txBody>
       </p:sp>
@@ -1772,38 +1769,37 @@
           <a:p>
             <a:pPr lvl="0"/>
             <a:r>
-              <a:rPr lang="zh-TW" altLang="en-US" smtClean="0"/>
+              <a:rPr lang="zh-TW" altLang="en-US"/>
               <a:t>按一下以編輯母片文字樣式</a:t>
             </a:r>
           </a:p>
           <a:p>
             <a:pPr lvl="1"/>
             <a:r>
-              <a:rPr lang="zh-TW" altLang="en-US" smtClean="0"/>
+              <a:rPr lang="zh-TW" altLang="en-US"/>
               <a:t>第二層</a:t>
             </a:r>
           </a:p>
           <a:p>
             <a:pPr lvl="2"/>
             <a:r>
-              <a:rPr lang="zh-TW" altLang="en-US" smtClean="0"/>
+              <a:rPr lang="zh-TW" altLang="en-US"/>
               <a:t>第三層</a:t>
             </a:r>
           </a:p>
           <a:p>
             <a:pPr lvl="3"/>
             <a:r>
-              <a:rPr lang="zh-TW" altLang="en-US" smtClean="0"/>
+              <a:rPr lang="zh-TW" altLang="en-US"/>
               <a:t>第四層</a:t>
             </a:r>
           </a:p>
           <a:p>
             <a:pPr lvl="4"/>
             <a:r>
-              <a:rPr lang="zh-TW" altLang="en-US" smtClean="0"/>
+              <a:rPr lang="zh-TW" altLang="en-US"/>
               <a:t>第五層</a:t>
             </a:r>
-            <a:endParaRPr lang="zh-TW" altLang="en-US"/>
           </a:p>
         </p:txBody>
       </p:sp>
@@ -1944,10 +1940,9 @@
           <a:lstStyle/>
           <a:p>
             <a:r>
-              <a:rPr lang="zh-TW" altLang="en-US" smtClean="0"/>
+              <a:rPr lang="zh-TW" altLang="en-US"/>
               <a:t>按一下以編輯母片標題樣式</a:t>
             </a:r>
-            <a:endParaRPr lang="zh-TW" altLang="en-US"/>
           </a:p>
         </p:txBody>
       </p:sp>
@@ -1968,38 +1963,37 @@
           <a:p>
             <a:pPr lvl="0"/>
             <a:r>
-              <a:rPr lang="zh-TW" altLang="en-US" smtClean="0"/>
+              <a:rPr lang="zh-TW" altLang="en-US"/>
               <a:t>按一下以編輯母片文字樣式</a:t>
             </a:r>
           </a:p>
           <a:p>
             <a:pPr lvl="1"/>
             <a:r>
-              <a:rPr lang="zh-TW" altLang="en-US" smtClean="0"/>
+              <a:rPr lang="zh-TW" altLang="en-US"/>
               <a:t>第二層</a:t>
             </a:r>
           </a:p>
           <a:p>
             <a:pPr lvl="2"/>
             <a:r>
-              <a:rPr lang="zh-TW" altLang="en-US" smtClean="0"/>
+              <a:rPr lang="zh-TW" altLang="en-US"/>
               <a:t>第三層</a:t>
             </a:r>
           </a:p>
           <a:p>
             <a:pPr lvl="3"/>
             <a:r>
-              <a:rPr lang="zh-TW" altLang="en-US" smtClean="0"/>
+              <a:rPr lang="zh-TW" altLang="en-US"/>
               <a:t>第四層</a:t>
             </a:r>
           </a:p>
           <a:p>
             <a:pPr lvl="4"/>
             <a:r>
-              <a:rPr lang="zh-TW" altLang="en-US" smtClean="0"/>
+              <a:rPr lang="zh-TW" altLang="en-US"/>
               <a:t>第五層</a:t>
             </a:r>
-            <a:endParaRPr lang="zh-TW" altLang="en-US"/>
           </a:p>
         </p:txBody>
       </p:sp>
@@ -2149,10 +2143,9 @@
           </a:lstStyle>
           <a:p>
             <a:r>
-              <a:rPr lang="zh-TW" altLang="en-US" smtClean="0"/>
+              <a:rPr lang="zh-TW" altLang="en-US"/>
               <a:t>按一下以編輯母片標題樣式</a:t>
             </a:r>
-            <a:endParaRPr lang="zh-TW" altLang="en-US"/>
           </a:p>
         </p:txBody>
       </p:sp>
@@ -2215,7 +2208,7 @@
           <a:p>
             <a:pPr lvl="0"/>
             <a:r>
-              <a:rPr lang="zh-TW" altLang="en-US" smtClean="0"/>
+              <a:rPr lang="zh-TW" altLang="en-US"/>
               <a:t>按一下以編輯母片文字樣式</a:t>
             </a:r>
           </a:p>
@@ -2358,10 +2351,9 @@
           <a:lstStyle/>
           <a:p>
             <a:r>
-              <a:rPr lang="zh-TW" altLang="en-US" smtClean="0"/>
+              <a:rPr lang="zh-TW" altLang="en-US"/>
               <a:t>按一下以編輯母片標題樣式</a:t>
             </a:r>
-            <a:endParaRPr lang="zh-TW" altLang="en-US"/>
           </a:p>
         </p:txBody>
       </p:sp>
@@ -2415,38 +2407,37 @@
           <a:p>
             <a:pPr lvl="0"/>
             <a:r>
-              <a:rPr lang="zh-TW" altLang="en-US" smtClean="0"/>
+              <a:rPr lang="zh-TW" altLang="en-US"/>
               <a:t>按一下以編輯母片文字樣式</a:t>
             </a:r>
           </a:p>
           <a:p>
             <a:pPr lvl="1"/>
             <a:r>
-              <a:rPr lang="zh-TW" altLang="en-US" smtClean="0"/>
+              <a:rPr lang="zh-TW" altLang="en-US"/>
               <a:t>第二層</a:t>
             </a:r>
           </a:p>
           <a:p>
             <a:pPr lvl="2"/>
             <a:r>
-              <a:rPr lang="zh-TW" altLang="en-US" smtClean="0"/>
+              <a:rPr lang="zh-TW" altLang="en-US"/>
               <a:t>第三層</a:t>
             </a:r>
           </a:p>
           <a:p>
             <a:pPr lvl="3"/>
             <a:r>
-              <a:rPr lang="zh-TW" altLang="en-US" smtClean="0"/>
+              <a:rPr lang="zh-TW" altLang="en-US"/>
               <a:t>第四層</a:t>
             </a:r>
           </a:p>
           <a:p>
             <a:pPr lvl="4"/>
             <a:r>
-              <a:rPr lang="zh-TW" altLang="en-US" smtClean="0"/>
+              <a:rPr lang="zh-TW" altLang="en-US"/>
               <a:t>第五層</a:t>
             </a:r>
-            <a:endParaRPr lang="zh-TW" altLang="en-US"/>
           </a:p>
         </p:txBody>
       </p:sp>
@@ -2500,38 +2491,37 @@
           <a:p>
             <a:pPr lvl="0"/>
             <a:r>
-              <a:rPr lang="zh-TW" altLang="en-US" smtClean="0"/>
+              <a:rPr lang="zh-TW" altLang="en-US"/>
               <a:t>按一下以編輯母片文字樣式</a:t>
             </a:r>
           </a:p>
           <a:p>
             <a:pPr lvl="1"/>
             <a:r>
-              <a:rPr lang="zh-TW" altLang="en-US" smtClean="0"/>
+              <a:rPr lang="zh-TW" altLang="en-US"/>
               <a:t>第二層</a:t>
             </a:r>
           </a:p>
           <a:p>
             <a:pPr lvl="2"/>
             <a:r>
-              <a:rPr lang="zh-TW" altLang="en-US" smtClean="0"/>
+              <a:rPr lang="zh-TW" altLang="en-US"/>
               <a:t>第三層</a:t>
             </a:r>
           </a:p>
           <a:p>
             <a:pPr lvl="3"/>
             <a:r>
-              <a:rPr lang="zh-TW" altLang="en-US" smtClean="0"/>
+              <a:rPr lang="zh-TW" altLang="en-US"/>
               <a:t>第四層</a:t>
             </a:r>
           </a:p>
           <a:p>
             <a:pPr lvl="4"/>
             <a:r>
-              <a:rPr lang="zh-TW" altLang="en-US" smtClean="0"/>
+              <a:rPr lang="zh-TW" altLang="en-US"/>
               <a:t>第五層</a:t>
             </a:r>
-            <a:endParaRPr lang="zh-TW" altLang="en-US"/>
           </a:p>
         </p:txBody>
       </p:sp>
@@ -2681,10 +2671,9 @@
           </a:lstStyle>
           <a:p>
             <a:r>
-              <a:rPr lang="zh-TW" altLang="en-US" smtClean="0"/>
+              <a:rPr lang="zh-TW" altLang="en-US"/>
               <a:t>按一下以編輯母片標題樣式</a:t>
             </a:r>
-            <a:endParaRPr lang="zh-TW" altLang="en-US"/>
           </a:p>
         </p:txBody>
       </p:sp>
@@ -2747,7 +2736,7 @@
           <a:p>
             <a:pPr lvl="0"/>
             <a:r>
-              <a:rPr lang="zh-TW" altLang="en-US" smtClean="0"/>
+              <a:rPr lang="zh-TW" altLang="en-US"/>
               <a:t>按一下以編輯母片文字樣式</a:t>
             </a:r>
           </a:p>
@@ -2803,38 +2792,37 @@
           <a:p>
             <a:pPr lvl="0"/>
             <a:r>
-              <a:rPr lang="zh-TW" altLang="en-US" smtClean="0"/>
+              <a:rPr lang="zh-TW" altLang="en-US"/>
               <a:t>按一下以編輯母片文字樣式</a:t>
             </a:r>
           </a:p>
           <a:p>
             <a:pPr lvl="1"/>
             <a:r>
-              <a:rPr lang="zh-TW" altLang="en-US" smtClean="0"/>
+              <a:rPr lang="zh-TW" altLang="en-US"/>
               <a:t>第二層</a:t>
             </a:r>
           </a:p>
           <a:p>
             <a:pPr lvl="2"/>
             <a:r>
-              <a:rPr lang="zh-TW" altLang="en-US" smtClean="0"/>
+              <a:rPr lang="zh-TW" altLang="en-US"/>
               <a:t>第三層</a:t>
             </a:r>
           </a:p>
           <a:p>
             <a:pPr lvl="3"/>
             <a:r>
-              <a:rPr lang="zh-TW" altLang="en-US" smtClean="0"/>
+              <a:rPr lang="zh-TW" altLang="en-US"/>
               <a:t>第四層</a:t>
             </a:r>
           </a:p>
           <a:p>
             <a:pPr lvl="4"/>
             <a:r>
-              <a:rPr lang="zh-TW" altLang="en-US" smtClean="0"/>
+              <a:rPr lang="zh-TW" altLang="en-US"/>
               <a:t>第五層</a:t>
             </a:r>
-            <a:endParaRPr lang="zh-TW" altLang="en-US"/>
           </a:p>
         </p:txBody>
       </p:sp>
@@ -2897,7 +2885,7 @@
           <a:p>
             <a:pPr lvl="0"/>
             <a:r>
-              <a:rPr lang="zh-TW" altLang="en-US" smtClean="0"/>
+              <a:rPr lang="zh-TW" altLang="en-US"/>
               <a:t>按一下以編輯母片文字樣式</a:t>
             </a:r>
           </a:p>
@@ -2953,38 +2941,37 @@
           <a:p>
             <a:pPr lvl="0"/>
             <a:r>
-              <a:rPr lang="zh-TW" altLang="en-US" smtClean="0"/>
+              <a:rPr lang="zh-TW" altLang="en-US"/>
               <a:t>按一下以編輯母片文字樣式</a:t>
             </a:r>
           </a:p>
           <a:p>
             <a:pPr lvl="1"/>
             <a:r>
-              <a:rPr lang="zh-TW" altLang="en-US" smtClean="0"/>
+              <a:rPr lang="zh-TW" altLang="en-US"/>
               <a:t>第二層</a:t>
             </a:r>
           </a:p>
           <a:p>
             <a:pPr lvl="2"/>
             <a:r>
-              <a:rPr lang="zh-TW" altLang="en-US" smtClean="0"/>
+              <a:rPr lang="zh-TW" altLang="en-US"/>
               <a:t>第三層</a:t>
             </a:r>
           </a:p>
           <a:p>
             <a:pPr lvl="3"/>
             <a:r>
-              <a:rPr lang="zh-TW" altLang="en-US" smtClean="0"/>
+              <a:rPr lang="zh-TW" altLang="en-US"/>
               <a:t>第四層</a:t>
             </a:r>
           </a:p>
           <a:p>
             <a:pPr lvl="4"/>
             <a:r>
-              <a:rPr lang="zh-TW" altLang="en-US" smtClean="0"/>
+              <a:rPr lang="zh-TW" altLang="en-US"/>
               <a:t>第五層</a:t>
             </a:r>
-            <a:endParaRPr lang="zh-TW" altLang="en-US"/>
           </a:p>
         </p:txBody>
       </p:sp>
@@ -3125,10 +3112,9 @@
           <a:lstStyle/>
           <a:p>
             <a:r>
-              <a:rPr lang="zh-TW" altLang="en-US" smtClean="0"/>
+              <a:rPr lang="zh-TW" altLang="en-US"/>
               <a:t>按一下以編輯母片標題樣式</a:t>
             </a:r>
-            <a:endParaRPr lang="zh-TW" altLang="en-US"/>
           </a:p>
         </p:txBody>
       </p:sp>
@@ -3399,10 +3385,9 @@
           </a:lstStyle>
           <a:p>
             <a:r>
-              <a:rPr lang="zh-TW" altLang="en-US" smtClean="0"/>
+              <a:rPr lang="zh-TW" altLang="en-US"/>
               <a:t>按一下以編輯母片標題樣式</a:t>
             </a:r>
-            <a:endParaRPr lang="zh-TW" altLang="en-US"/>
           </a:p>
         </p:txBody>
       </p:sp>
@@ -3456,38 +3441,37 @@
           <a:p>
             <a:pPr lvl="0"/>
             <a:r>
-              <a:rPr lang="zh-TW" altLang="en-US" smtClean="0"/>
+              <a:rPr lang="zh-TW" altLang="en-US"/>
               <a:t>按一下以編輯母片文字樣式</a:t>
             </a:r>
           </a:p>
           <a:p>
             <a:pPr lvl="1"/>
             <a:r>
-              <a:rPr lang="zh-TW" altLang="en-US" smtClean="0"/>
+              <a:rPr lang="zh-TW" altLang="en-US"/>
               <a:t>第二層</a:t>
             </a:r>
           </a:p>
           <a:p>
             <a:pPr lvl="2"/>
             <a:r>
-              <a:rPr lang="zh-TW" altLang="en-US" smtClean="0"/>
+              <a:rPr lang="zh-TW" altLang="en-US"/>
               <a:t>第三層</a:t>
             </a:r>
           </a:p>
           <a:p>
             <a:pPr lvl="3"/>
             <a:r>
-              <a:rPr lang="zh-TW" altLang="en-US" smtClean="0"/>
+              <a:rPr lang="zh-TW" altLang="en-US"/>
               <a:t>第四層</a:t>
             </a:r>
           </a:p>
           <a:p>
             <a:pPr lvl="4"/>
             <a:r>
-              <a:rPr lang="zh-TW" altLang="en-US" smtClean="0"/>
+              <a:rPr lang="zh-TW" altLang="en-US"/>
               <a:t>第五層</a:t>
             </a:r>
-            <a:endParaRPr lang="zh-TW" altLang="en-US"/>
           </a:p>
         </p:txBody>
       </p:sp>
@@ -3550,7 +3534,7 @@
           <a:p>
             <a:pPr lvl="0"/>
             <a:r>
-              <a:rPr lang="zh-TW" altLang="en-US" smtClean="0"/>
+              <a:rPr lang="zh-TW" altLang="en-US"/>
               <a:t>按一下以編輯母片文字樣式</a:t>
             </a:r>
           </a:p>
@@ -3702,10 +3686,9 @@
           </a:lstStyle>
           <a:p>
             <a:r>
-              <a:rPr lang="zh-TW" altLang="en-US" smtClean="0"/>
+              <a:rPr lang="zh-TW" altLang="en-US"/>
               <a:t>按一下以編輯母片標題樣式</a:t>
             </a:r>
-            <a:endParaRPr lang="zh-TW" altLang="en-US"/>
           </a:p>
         </p:txBody>
       </p:sp>
@@ -3767,7 +3750,7 @@
           </a:lstStyle>
           <a:p>
             <a:pPr lvl="0"/>
-            <a:endParaRPr lang="zh-TW" altLang="en-US" noProof="0" smtClean="0"/>
+            <a:endParaRPr lang="zh-TW" altLang="en-US" noProof="0"/>
           </a:p>
         </p:txBody>
       </p:sp>
@@ -3830,7 +3813,7 @@
           <a:p>
             <a:pPr lvl="0"/>
             <a:r>
-              <a:rPr lang="zh-TW" altLang="en-US" smtClean="0"/>
+              <a:rPr lang="zh-TW" altLang="en-US"/>
               <a:t>按一下以編輯母片文字樣式</a:t>
             </a:r>
           </a:p>
@@ -4113,7 +4096,7 @@
             <a:pPr algn="ctr" eaLnBrk="1" hangingPunct="1">
               <a:defRPr/>
             </a:pPr>
-            <a:endParaRPr lang="zh-TW" altLang="zh-TW" sz="2400" smtClean="0"/>
+            <a:endParaRPr lang="zh-TW" altLang="zh-TW" sz="2400"/>
           </a:p>
         </p:txBody>
       </p:sp>
@@ -4273,7 +4256,7 @@
             <a:pPr algn="ctr" eaLnBrk="1" hangingPunct="1">
               <a:defRPr/>
             </a:pPr>
-            <a:endParaRPr lang="zh-TW" altLang="zh-TW" sz="2400" smtClean="0"/>
+            <a:endParaRPr lang="zh-TW" altLang="zh-TW" sz="2400"/>
           </a:p>
         </p:txBody>
       </p:sp>
@@ -4425,7 +4408,7 @@
             <a:pPr algn="ctr" eaLnBrk="1" hangingPunct="1">
               <a:defRPr/>
             </a:pPr>
-            <a:endParaRPr lang="zh-TW" altLang="zh-TW" sz="2400" smtClean="0"/>
+            <a:endParaRPr lang="zh-TW" altLang="zh-TW" sz="2400"/>
           </a:p>
         </p:txBody>
       </p:sp>
@@ -4585,7 +4568,7 @@
             <a:pPr algn="ctr" eaLnBrk="1" hangingPunct="1">
               <a:defRPr/>
             </a:pPr>
-            <a:endParaRPr lang="zh-TW" altLang="zh-TW" sz="2400" smtClean="0"/>
+            <a:endParaRPr lang="zh-TW" altLang="zh-TW" sz="2400"/>
           </a:p>
         </p:txBody>
       </p:sp>
@@ -4745,7 +4728,7 @@
             <a:pPr algn="ctr" eaLnBrk="1" hangingPunct="1">
               <a:defRPr/>
             </a:pPr>
-            <a:endParaRPr lang="zh-TW" altLang="zh-TW" sz="2400" smtClean="0"/>
+            <a:endParaRPr lang="zh-TW" altLang="zh-TW" sz="2400"/>
           </a:p>
         </p:txBody>
       </p:sp>
@@ -4897,7 +4880,7 @@
             <a:pPr algn="ctr" eaLnBrk="1" hangingPunct="1">
               <a:defRPr/>
             </a:pPr>
-            <a:endParaRPr lang="zh-TW" altLang="zh-TW" sz="2400" smtClean="0"/>
+            <a:endParaRPr lang="zh-TW" altLang="zh-TW" sz="2400"/>
           </a:p>
         </p:txBody>
       </p:sp>
@@ -5057,7 +5040,7 @@
             <a:pPr algn="ctr" eaLnBrk="1" hangingPunct="1">
               <a:defRPr/>
             </a:pPr>
-            <a:endParaRPr lang="zh-TW" altLang="zh-TW" sz="2400" smtClean="0"/>
+            <a:endParaRPr lang="zh-TW" altLang="zh-TW" sz="2400"/>
           </a:p>
         </p:txBody>
       </p:sp>
@@ -5113,7 +5096,7 @@
           <a:p>
             <a:pPr lvl="0"/>
             <a:r>
-              <a:rPr lang="zh-TW" altLang="en-US" smtClean="0"/>
+              <a:rPr lang="zh-TW" altLang="en-US"/>
               <a:t>按一下以編輯母片標題樣式</a:t>
             </a:r>
           </a:p>
@@ -5171,35 +5154,35 @@
           <a:p>
             <a:pPr lvl="0"/>
             <a:r>
-              <a:rPr lang="zh-TW" altLang="en-US" smtClean="0"/>
+              <a:rPr lang="zh-TW" altLang="en-US"/>
               <a:t>按一下以編輯母片</a:t>
             </a:r>
           </a:p>
           <a:p>
             <a:pPr lvl="1"/>
             <a:r>
-              <a:rPr lang="zh-TW" altLang="en-US" smtClean="0"/>
+              <a:rPr lang="zh-TW" altLang="en-US"/>
               <a:t>第二層</a:t>
             </a:r>
           </a:p>
           <a:p>
             <a:pPr lvl="2"/>
             <a:r>
-              <a:rPr lang="zh-TW" altLang="en-US" smtClean="0"/>
+              <a:rPr lang="zh-TW" altLang="en-US"/>
               <a:t>第三層</a:t>
             </a:r>
           </a:p>
           <a:p>
             <a:pPr lvl="3"/>
             <a:r>
-              <a:rPr lang="zh-TW" altLang="en-US" smtClean="0"/>
+              <a:rPr lang="zh-TW" altLang="en-US"/>
               <a:t>第四層</a:t>
             </a:r>
           </a:p>
           <a:p>
             <a:pPr lvl="4"/>
             <a:r>
-              <a:rPr lang="zh-TW" altLang="en-US" smtClean="0"/>
+              <a:rPr lang="zh-TW" altLang="en-US"/>
               <a:t>第五層</a:t>
             </a:r>
           </a:p>
@@ -5846,10 +5829,9 @@
           <a:p>
             <a:pPr eaLnBrk="1" hangingPunct="1"/>
             <a:r>
-              <a:rPr lang="en-US" altLang="zh-TW" dirty="0" smtClean="0"/>
+              <a:rPr lang="en-US" altLang="zh-TW" dirty="0"/>
               <a:t>Counter</a:t>
             </a:r>
-            <a:endParaRPr lang="en-US" altLang="zh-TW" dirty="0" smtClean="0"/>
           </a:p>
         </p:txBody>
       </p:sp>
@@ -5869,7 +5851,7 @@
           <a:lstStyle/>
           <a:p>
             <a:pPr eaLnBrk="1" hangingPunct="1"/>
-            <a:endParaRPr lang="zh-TW" altLang="zh-TW" smtClean="0"/>
+            <a:endParaRPr lang="zh-TW" altLang="zh-TW"/>
           </a:p>
         </p:txBody>
       </p:sp>
@@ -6113,14 +6095,9 @@
               <a:buNone/>
             </a:pPr>
             <a:r>
-              <a:rPr lang="en-US" altLang="zh-TW" sz="3600" u="sng" dirty="0" smtClean="0"/>
-              <a:t>Lab </a:t>
+              <a:rPr lang="en-US" altLang="zh-TW" sz="3600" u="sng" dirty="0"/>
+              <a:t>Lab 04</a:t>
             </a:r>
-            <a:r>
-              <a:rPr lang="en-US" altLang="zh-TW" sz="3600" u="sng" dirty="0" smtClean="0"/>
-              <a:t>04</a:t>
-            </a:r>
-            <a:endParaRPr lang="en-US" altLang="zh-TW" sz="3600" u="sng" dirty="0"/>
           </a:p>
         </p:txBody>
       </p:sp>
@@ -6166,14 +6143,9 @@
           <a:p>
             <a:pPr eaLnBrk="1" hangingPunct="1"/>
             <a:r>
-              <a:rPr lang="en-US" altLang="zh-TW" dirty="0" smtClean="0"/>
-              <a:t>The </a:t>
+              <a:rPr lang="en-US" altLang="zh-TW" dirty="0"/>
+              <a:t>The Full Spec</a:t>
             </a:r>
-            <a:r>
-              <a:rPr lang="en-US" altLang="zh-TW" dirty="0" smtClean="0"/>
-              <a:t>Full Spec</a:t>
-            </a:r>
-            <a:endParaRPr lang="en-US" altLang="zh-TW" dirty="0" smtClean="0"/>
           </a:p>
         </p:txBody>
       </p:sp>
@@ -6190,7 +6162,7 @@
         <p:spPr>
           <a:xfrm>
             <a:off x="539749" y="2133600"/>
-            <a:ext cx="6048375" cy="863600"/>
+            <a:ext cx="6048375" cy="1217934"/>
           </a:xfrm>
         </p:spPr>
         <p:txBody>
@@ -6203,7 +6175,7 @@
               </a:lnSpc>
             </a:pPr>
             <a:r>
-              <a:rPr lang="en-US" altLang="zh-TW" sz="2000" dirty="0" smtClean="0"/>
+              <a:rPr lang="en-US" altLang="zh-TW" sz="2000" dirty="0"/>
               <a:t>Display counting content (Q) on LEDs</a:t>
             </a:r>
           </a:p>
@@ -6214,10 +6186,20 @@
               </a:lnSpc>
             </a:pPr>
             <a:r>
-              <a:rPr lang="en-US" altLang="zh-TW" sz="2000" dirty="0" smtClean="0"/>
+              <a:rPr lang="en-US" altLang="zh-TW" sz="2000" dirty="0"/>
               <a:t>Use dip-switches to set inputs (S and D)</a:t>
             </a:r>
-            <a:endParaRPr lang="en-US" altLang="zh-TW" sz="2000" dirty="0" smtClean="0"/>
+          </a:p>
+          <a:p>
+            <a:pPr eaLnBrk="1" hangingPunct="1">
+              <a:lnSpc>
+                <a:spcPct val="80000"/>
+              </a:lnSpc>
+            </a:pPr>
+            <a:r>
+              <a:rPr lang="en-US" altLang="zh-TW" sz="2000" dirty="0"/>
+              <a:t>Remark: 1 Hz clock generation module with be provided</a:t>
+            </a:r>
           </a:p>
         </p:txBody>
       </p:sp>
@@ -8286,7 +8268,7 @@
               <a:lstStyle/>
               <a:p>
                 <a:r>
-                  <a:rPr lang="en-US" altLang="zh-TW" dirty="0" smtClean="0"/>
+                  <a:rPr lang="en-US" altLang="zh-TW" dirty="0"/>
                   <a:t>2</a:t>
                 </a:r>
                 <a:endParaRPr lang="zh-TW" altLang="en-US" dirty="0"/>
@@ -8316,7 +8298,7 @@
               <a:lstStyle/>
               <a:p>
                 <a:r>
-                  <a:rPr lang="en-US" altLang="zh-TW" dirty="0" smtClean="0"/>
+                  <a:rPr lang="en-US" altLang="zh-TW" dirty="0"/>
                   <a:t>S</a:t>
                 </a:r>
                 <a:endParaRPr lang="zh-TW" altLang="en-US" dirty="0"/>
@@ -8620,12 +8602,8 @@
                 <a:buNone/>
               </a:pPr>
               <a:r>
-                <a:rPr lang="en-US" altLang="zh-TW" sz="1600" dirty="0" smtClean="0"/>
-                <a:t>S1(t</a:t>
-              </a:r>
-              <a:r>
                 <a:rPr lang="en-US" altLang="zh-TW" sz="1600" dirty="0"/>
-                <a:t>)</a:t>
+                <a:t>S1(t)</a:t>
               </a:r>
             </a:p>
           </p:txBody>
@@ -8870,12 +8848,8 @@
                 <a:buNone/>
               </a:pPr>
               <a:r>
-                <a:rPr lang="en-US" altLang="zh-TW" sz="1600" dirty="0" smtClean="0"/>
-                <a:t>S0(t</a:t>
-              </a:r>
-              <a:r>
                 <a:rPr lang="en-US" altLang="zh-TW" sz="1600" dirty="0"/>
-                <a:t>)</a:t>
+                <a:t>S0(t)</a:t>
               </a:r>
             </a:p>
           </p:txBody>
@@ -11179,10 +11153,9 @@
                   <a:buNone/>
                 </a:pPr>
                 <a:r>
-                  <a:rPr lang="en-US" altLang="zh-TW" sz="1600" dirty="0" smtClean="0"/>
+                  <a:rPr lang="en-US" altLang="zh-TW" sz="1600" dirty="0"/>
                   <a:t>0</a:t>
                 </a:r>
-                <a:endParaRPr lang="en-US" altLang="zh-TW" sz="1600" dirty="0"/>
               </a:p>
             </p:txBody>
           </p:sp>
@@ -11427,13 +11400,8 @@
                 </a:pPr>
                 <a:r>
                   <a:rPr lang="en-US" altLang="zh-TW" sz="1600" dirty="0"/>
-                  <a:t>Q(t+1</a:t>
+                  <a:t>Q(t+1)=Q(t)-1</a:t>
                 </a:r>
-                <a:r>
-                  <a:rPr lang="en-US" altLang="zh-TW" sz="1600" dirty="0" smtClean="0"/>
-                  <a:t>)=Q(t)-1</a:t>
-                </a:r>
-                <a:endParaRPr lang="en-US" altLang="zh-TW" sz="1600" dirty="0"/>
               </a:p>
             </p:txBody>
           </p:sp>
@@ -11940,10 +11908,9 @@
                   <a:buNone/>
                 </a:pPr>
                 <a:r>
-                  <a:rPr lang="en-US" altLang="zh-TW" sz="1600" dirty="0" smtClean="0"/>
+                  <a:rPr lang="en-US" altLang="zh-TW" sz="1600" dirty="0"/>
                   <a:t>1</a:t>
                 </a:r>
-                <a:endParaRPr lang="en-US" altLang="zh-TW" sz="1600" dirty="0"/>
               </a:p>
             </p:txBody>
           </p:sp>
@@ -12205,13 +12172,6 @@
   <p:clrMapOvr>
     <a:masterClrMapping/>
   </p:clrMapOvr>
-  <p:timing>
-    <p:tnLst>
-      <p:par>
-        <p:cTn id="1" dur="indefinite" restart="never" nodeType="tmRoot"/>
-      </p:par>
-    </p:tnLst>
-  </p:timing>
 </p:sld>
 </file>
 
@@ -12248,7 +12208,7 @@
           <a:lstStyle/>
           <a:p>
             <a:r>
-              <a:rPr lang="en-US" altLang="zh-TW" dirty="0" smtClean="0"/>
+              <a:rPr lang="en-US" altLang="zh-TW" dirty="0"/>
               <a:t>Grading Policy</a:t>
             </a:r>
             <a:endParaRPr lang="zh-TW" altLang="en-US" dirty="0"/>
@@ -12271,33 +12231,33 @@
           <a:lstStyle/>
           <a:p>
             <a:r>
-              <a:rPr lang="en-US" altLang="zh-TW" dirty="0" smtClean="0"/>
+              <a:rPr lang="en-US" altLang="zh-TW" dirty="0"/>
               <a:t>Basic (70%): only hold and count-up function</a:t>
             </a:r>
           </a:p>
           <a:p>
             <a:r>
-              <a:rPr lang="en-US" altLang="zh-TW" dirty="0" smtClean="0"/>
+              <a:rPr lang="en-US" altLang="zh-TW" dirty="0"/>
               <a:t>Bonus:</a:t>
             </a:r>
           </a:p>
           <a:p>
             <a:pPr lvl="1"/>
             <a:r>
-              <a:rPr lang="en-US" altLang="zh-TW" dirty="0" smtClean="0"/>
+              <a:rPr lang="en-US" altLang="zh-TW" dirty="0"/>
               <a:t>+10%: count-down function</a:t>
             </a:r>
           </a:p>
           <a:p>
             <a:pPr lvl="1"/>
             <a:r>
-              <a:rPr lang="en-US" altLang="zh-TW" dirty="0" smtClean="0"/>
+              <a:rPr lang="en-US" altLang="zh-TW" dirty="0"/>
               <a:t>+10%: load content function</a:t>
             </a:r>
           </a:p>
           <a:p>
             <a:r>
-              <a:rPr lang="en-US" altLang="zh-TW" dirty="0" smtClean="0"/>
+              <a:rPr lang="en-US" altLang="zh-TW" dirty="0"/>
               <a:t>Report: 10%</a:t>
             </a:r>
             <a:endParaRPr lang="zh-TW" altLang="en-US" dirty="0"/>
@@ -12351,7 +12311,7 @@
           <a:p>
             <a:pPr eaLnBrk="1" hangingPunct="1"/>
             <a:r>
-              <a:rPr lang="en-US" altLang="zh-TW" smtClean="0"/>
+              <a:rPr lang="en-US" altLang="zh-TW"/>
               <a:t>Pre-Lab Report</a:t>
             </a:r>
           </a:p>
@@ -12380,7 +12340,7 @@
               <a:buAutoNum type="arabicParenBoth"/>
             </a:pPr>
             <a:r>
-              <a:rPr lang="en-US" altLang="zh-TW" dirty="0" smtClean="0"/>
+              <a:rPr lang="en-US" altLang="zh-TW" dirty="0"/>
               <a:t>Draw the circuit diagram of the “full spec” design</a:t>
             </a:r>
           </a:p>
@@ -12393,10 +12353,9 @@
               <a:buAutoNum type="arabicParenBoth"/>
             </a:pPr>
             <a:r>
-              <a:rPr lang="en-US" altLang="zh-TW" dirty="0" smtClean="0"/>
+              <a:rPr lang="en-US" altLang="zh-TW" dirty="0"/>
               <a:t>Expected waveform of each functionality</a:t>
             </a:r>
-            <a:endParaRPr lang="en-US" altLang="zh-TW" dirty="0" smtClean="0"/>
           </a:p>
         </p:txBody>
       </p:sp>
@@ -12405,13 +12364,6 @@
   <p:clrMapOvr>
     <a:masterClrMapping/>
   </p:clrMapOvr>
-  <p:timing>
-    <p:tnLst>
-      <p:par>
-        <p:cTn id="1" dur="indefinite" restart="never" nodeType="tmRoot"/>
-      </p:par>
-    </p:tnLst>
-  </p:timing>
 </p:sld>
 </file>
 

</xml_diff>